<commit_message>
Update experiment with latest results
</commit_message>
<xml_diff>
--- a/slides/master-thesis.pptx
+++ b/slides/master-thesis.pptx
@@ -204,10 +204,6 @@
 </p:presentation>
 </file>
 
-<file path=ppt/revisionInfo.xml><?xml version="1.0" encoding="utf-8"?>
-<p1510:revInfo xmlns:a="http://schemas.openxmlformats.org/drawingml/2006/main" xmlns:r="http://schemas.openxmlformats.org/officeDocument/2006/relationships" xmlns:p1510="http://schemas.microsoft.com/office/powerpoint/2015/10/main"/>
-</file>
-
 <file path=ppt/notesMasters/notesMaster1.xml><?xml version="1.0" encoding="utf-8"?>
 <p:notesMaster xmlns:a="http://schemas.openxmlformats.org/drawingml/2006/main" xmlns:r="http://schemas.openxmlformats.org/officeDocument/2006/relationships" xmlns:p="http://schemas.openxmlformats.org/presentationml/2006/main">
   <p:cSld>
@@ -290,7 +286,7 @@
           <a:p>
             <a:fld id="{8FA95026-C7B0-4E4C-9E54-4192C4CF483B}" type="datetimeFigureOut">
               <a:rPr lang="en-US" smtClean="0"/>
-              <a:t>1/25/2018</a:t>
+              <a:t>2/22/2018</a:t>
             </a:fld>
             <a:endParaRPr lang="en-US" dirty="0"/>
           </a:p>
@@ -1285,7 +1281,7 @@
           <a:p>
             <a:fld id="{DF1AF6FE-015F-4078-BF2F-2D2DF7EC569E}" type="datetime1">
               <a:rPr lang="en-US" smtClean="0"/>
-              <a:t>1/25/2018</a:t>
+              <a:t>2/22/2018</a:t>
             </a:fld>
             <a:endParaRPr lang="en-US" dirty="0"/>
           </a:p>
@@ -1455,7 +1451,7 @@
           <a:p>
             <a:fld id="{9410FB1F-C65D-410E-A887-A457DC681F0A}" type="datetime1">
               <a:rPr lang="en-US" smtClean="0"/>
-              <a:t>1/25/2018</a:t>
+              <a:t>2/22/2018</a:t>
             </a:fld>
             <a:endParaRPr lang="en-US" dirty="0"/>
           </a:p>
@@ -1635,7 +1631,7 @@
           <a:p>
             <a:fld id="{DF0BA256-52B2-4372-B65C-29515A3B82D8}" type="datetime1">
               <a:rPr lang="en-US" smtClean="0"/>
-              <a:t>1/25/2018</a:t>
+              <a:t>2/22/2018</a:t>
             </a:fld>
             <a:endParaRPr lang="en-US" dirty="0"/>
           </a:p>
@@ -1805,7 +1801,7 @@
           <a:p>
             <a:fld id="{8090312F-9D4C-4FF0-B822-D31616BC5789}" type="datetime1">
               <a:rPr lang="en-US" smtClean="0"/>
-              <a:t>1/25/2018</a:t>
+              <a:t>2/22/2018</a:t>
             </a:fld>
             <a:endParaRPr lang="en-US" dirty="0"/>
           </a:p>
@@ -2049,7 +2045,7 @@
           <a:p>
             <a:fld id="{D8A77D4F-7A6F-4C23-8EA1-33C3D20C4974}" type="datetime1">
               <a:rPr lang="en-US" smtClean="0"/>
-              <a:t>1/25/2018</a:t>
+              <a:t>2/22/2018</a:t>
             </a:fld>
             <a:endParaRPr lang="en-US" dirty="0"/>
           </a:p>
@@ -2281,7 +2277,7 @@
           <a:p>
             <a:fld id="{52BEDE80-1DAB-4284-BA14-D8B17517EB47}" type="datetime1">
               <a:rPr lang="en-US" smtClean="0"/>
-              <a:t>1/25/2018</a:t>
+              <a:t>2/22/2018</a:t>
             </a:fld>
             <a:endParaRPr lang="en-US" dirty="0"/>
           </a:p>
@@ -2648,7 +2644,7 @@
           <a:p>
             <a:fld id="{77851319-64B6-4693-A01F-1D8FFC3C4828}" type="datetime1">
               <a:rPr lang="en-US" smtClean="0"/>
-              <a:t>1/25/2018</a:t>
+              <a:t>2/22/2018</a:t>
             </a:fld>
             <a:endParaRPr lang="en-US" dirty="0"/>
           </a:p>
@@ -2766,7 +2762,7 @@
           <a:p>
             <a:fld id="{4089680D-7BF3-4A4B-8436-B89574919FF5}" type="datetime1">
               <a:rPr lang="en-US" smtClean="0"/>
-              <a:t>1/25/2018</a:t>
+              <a:t>2/22/2018</a:t>
             </a:fld>
             <a:endParaRPr lang="en-US" dirty="0"/>
           </a:p>
@@ -2861,7 +2857,7 @@
           <a:p>
             <a:fld id="{FF6D001B-982C-4A76-997D-C51363271C1A}" type="datetime1">
               <a:rPr lang="en-US" smtClean="0"/>
-              <a:t>1/25/2018</a:t>
+              <a:t>2/22/2018</a:t>
             </a:fld>
             <a:endParaRPr lang="en-US" dirty="0"/>
           </a:p>
@@ -3138,7 +3134,7 @@
           <a:p>
             <a:fld id="{32ADC642-7463-47BC-AA13-E9A74C2E28CA}" type="datetime1">
               <a:rPr lang="en-US" smtClean="0"/>
-              <a:t>1/25/2018</a:t>
+              <a:t>2/22/2018</a:t>
             </a:fld>
             <a:endParaRPr lang="en-US" dirty="0"/>
           </a:p>
@@ -3394,7 +3390,7 @@
           <a:p>
             <a:fld id="{E1CB1000-7532-4338-99BE-823ED3F01D92}" type="datetime1">
               <a:rPr lang="en-US" smtClean="0"/>
-              <a:t>1/25/2018</a:t>
+              <a:t>2/22/2018</a:t>
             </a:fld>
             <a:endParaRPr lang="en-US" dirty="0"/>
           </a:p>
@@ -3607,7 +3603,7 @@
           <a:p>
             <a:fld id="{6E13F616-C90A-4E42-8B4E-405F56013004}" type="datetime1">
               <a:rPr lang="en-US" smtClean="0"/>
-              <a:t>1/25/2018</a:t>
+              <a:t>2/22/2018</a:t>
             </a:fld>
             <a:endParaRPr lang="en-US" dirty="0"/>
           </a:p>
@@ -5923,7 +5919,7 @@
           <p:nvPr>
             <p:extLst>
               <p:ext uri="{D42A27DB-BD31-4B8C-83A1-F6EECF244321}">
-                <p14:modId xmlns:p14="http://schemas.microsoft.com/office/powerpoint/2010/main" val="3555030907"/>
+                <p14:modId xmlns:p14="http://schemas.microsoft.com/office/powerpoint/2010/main" val="2240893456"/>
               </p:ext>
             </p:extLst>
           </p:nvPr>
@@ -6120,9 +6116,10 @@
                     <a:lstStyle/>
                     <a:p>
                       <a:r>
-                        <a:rPr lang="en-US" sz="1600" dirty="0"/>
-                        <a:t>0.73</a:t>
+                        <a:rPr lang="en-US" sz="1600"/>
+                        <a:t>0.74</a:t>
                       </a:r>
+                      <a:endParaRPr lang="en-US" sz="1600" dirty="0"/>
                     </a:p>
                   </a:txBody>
                   <a:tcPr/>

</xml_diff>